<commit_message>
refactoring, removed segments and beta slope
</commit_message>
<xml_diff>
--- a/blog/BayesianGolf.pptx
+++ b/blog/BayesianGolf.pptx
@@ -3746,7 +3746,7 @@
           <a:p>
             <a:r>
               <a:rPr lang="en-US" dirty="0" smtClean="0"/>
-              <a:t>Bayesian Data Analysis of PGA Scores with Stan</a:t>
+              <a:t>Bayesian Analysis of PGA Golf Scores with Stan</a:t>
             </a:r>
             <a:br>
               <a:rPr lang="en-US" dirty="0" smtClean="0"/>
@@ -3900,19 +3900,19 @@
           <a:p>
             <a:r>
               <a:rPr lang="en-US" dirty="0" smtClean="0"/>
-              <a:t>Simple Hierarchical Model</a:t>
+              <a:t>Multi-level Model of Scores and Tournaments</a:t>
             </a:r>
           </a:p>
           <a:p>
             <a:r>
               <a:rPr lang="en-US" dirty="0" smtClean="0"/>
-              <a:t>Stokes Gained Regression</a:t>
+              <a:t>Stokes Gained Intro and Score Regression</a:t>
             </a:r>
           </a:p>
           <a:p>
             <a:r>
               <a:rPr lang="en-US" dirty="0" smtClean="0"/>
-              <a:t>Time Series Modeling of Strokes Gained</a:t>
+              <a:t>Time Series Modeling of Strokes Gained </a:t>
             </a:r>
           </a:p>
           <a:p>

</xml_diff>